<commit_message>
01.02.2023 - Bookings steps finalised
</commit_message>
<xml_diff>
--- a/src/static_data/resa_process.pptx
+++ b/src/static_data/resa_process.pptx
@@ -262,7 +262,7 @@
           <a:p>
             <a:fld id="{E3435E70-22ED-4931-A57F-15FCCA1F0CAE}" type="datetimeFigureOut">
               <a:rPr lang="en-GB" smtClean="0"/>
-              <a:t>30/01/2023</a:t>
+              <a:t>01/02/2023</a:t>
             </a:fld>
             <a:endParaRPr lang="en-GB"/>
           </a:p>
@@ -462,7 +462,7 @@
           <a:p>
             <a:fld id="{E3435E70-22ED-4931-A57F-15FCCA1F0CAE}" type="datetimeFigureOut">
               <a:rPr lang="en-GB" smtClean="0"/>
-              <a:t>30/01/2023</a:t>
+              <a:t>01/02/2023</a:t>
             </a:fld>
             <a:endParaRPr lang="en-GB"/>
           </a:p>
@@ -672,7 +672,7 @@
           <a:p>
             <a:fld id="{E3435E70-22ED-4931-A57F-15FCCA1F0CAE}" type="datetimeFigureOut">
               <a:rPr lang="en-GB" smtClean="0"/>
-              <a:t>30/01/2023</a:t>
+              <a:t>01/02/2023</a:t>
             </a:fld>
             <a:endParaRPr lang="en-GB"/>
           </a:p>
@@ -872,7 +872,7 @@
           <a:p>
             <a:fld id="{E3435E70-22ED-4931-A57F-15FCCA1F0CAE}" type="datetimeFigureOut">
               <a:rPr lang="en-GB" smtClean="0"/>
-              <a:t>30/01/2023</a:t>
+              <a:t>01/02/2023</a:t>
             </a:fld>
             <a:endParaRPr lang="en-GB"/>
           </a:p>
@@ -1148,7 +1148,7 @@
           <a:p>
             <a:fld id="{E3435E70-22ED-4931-A57F-15FCCA1F0CAE}" type="datetimeFigureOut">
               <a:rPr lang="en-GB" smtClean="0"/>
-              <a:t>30/01/2023</a:t>
+              <a:t>01/02/2023</a:t>
             </a:fld>
             <a:endParaRPr lang="en-GB"/>
           </a:p>
@@ -1416,7 +1416,7 @@
           <a:p>
             <a:fld id="{E3435E70-22ED-4931-A57F-15FCCA1F0CAE}" type="datetimeFigureOut">
               <a:rPr lang="en-GB" smtClean="0"/>
-              <a:t>30/01/2023</a:t>
+              <a:t>01/02/2023</a:t>
             </a:fld>
             <a:endParaRPr lang="en-GB"/>
           </a:p>
@@ -1831,7 +1831,7 @@
           <a:p>
             <a:fld id="{E3435E70-22ED-4931-A57F-15FCCA1F0CAE}" type="datetimeFigureOut">
               <a:rPr lang="en-GB" smtClean="0"/>
-              <a:t>30/01/2023</a:t>
+              <a:t>01/02/2023</a:t>
             </a:fld>
             <a:endParaRPr lang="en-GB"/>
           </a:p>
@@ -1973,7 +1973,7 @@
           <a:p>
             <a:fld id="{E3435E70-22ED-4931-A57F-15FCCA1F0CAE}" type="datetimeFigureOut">
               <a:rPr lang="en-GB" smtClean="0"/>
-              <a:t>30/01/2023</a:t>
+              <a:t>01/02/2023</a:t>
             </a:fld>
             <a:endParaRPr lang="en-GB"/>
           </a:p>
@@ -2086,7 +2086,7 @@
           <a:p>
             <a:fld id="{E3435E70-22ED-4931-A57F-15FCCA1F0CAE}" type="datetimeFigureOut">
               <a:rPr lang="en-GB" smtClean="0"/>
-              <a:t>30/01/2023</a:t>
+              <a:t>01/02/2023</a:t>
             </a:fld>
             <a:endParaRPr lang="en-GB"/>
           </a:p>
@@ -2399,7 +2399,7 @@
           <a:p>
             <a:fld id="{E3435E70-22ED-4931-A57F-15FCCA1F0CAE}" type="datetimeFigureOut">
               <a:rPr lang="en-GB" smtClean="0"/>
-              <a:t>30/01/2023</a:t>
+              <a:t>01/02/2023</a:t>
             </a:fld>
             <a:endParaRPr lang="en-GB"/>
           </a:p>
@@ -2688,7 +2688,7 @@
           <a:p>
             <a:fld id="{E3435E70-22ED-4931-A57F-15FCCA1F0CAE}" type="datetimeFigureOut">
               <a:rPr lang="en-GB" smtClean="0"/>
-              <a:t>30/01/2023</a:t>
+              <a:t>01/02/2023</a:t>
             </a:fld>
             <a:endParaRPr lang="en-GB"/>
           </a:p>
@@ -2931,7 +2931,7 @@
           <a:p>
             <a:fld id="{E3435E70-22ED-4931-A57F-15FCCA1F0CAE}" type="datetimeFigureOut">
               <a:rPr lang="en-GB" smtClean="0"/>
-              <a:t>30/01/2023</a:t>
+              <a:t>01/02/2023</a:t>
             </a:fld>
             <a:endParaRPr lang="en-GB"/>
           </a:p>
@@ -5448,7 +5448,7 @@
         </p:nvSpPr>
         <p:spPr>
           <a:xfrm>
-            <a:off x="1494301" y="4734247"/>
+            <a:off x="1494301" y="4558078"/>
             <a:ext cx="360000" cy="360000"/>
           </a:xfrm>
           <a:prstGeom prst="flowChartConnector">
@@ -5498,7 +5498,7 @@
         </p:nvSpPr>
         <p:spPr>
           <a:xfrm>
-            <a:off x="2486456" y="4734247"/>
+            <a:off x="2486456" y="4558078"/>
             <a:ext cx="360000" cy="360000"/>
           </a:xfrm>
           <a:prstGeom prst="flowChartConnector">
@@ -5563,7 +5563,7 @@
         </p:nvCxnSpPr>
         <p:spPr>
           <a:xfrm>
-            <a:off x="1854301" y="4914247"/>
+            <a:off x="1854301" y="4738078"/>
             <a:ext cx="632155" cy="0"/>
           </a:xfrm>
           <a:prstGeom prst="line">
@@ -5609,7 +5609,7 @@
         </p:nvSpPr>
         <p:spPr>
           <a:xfrm>
-            <a:off x="1048624" y="5082339"/>
+            <a:off x="1048624" y="4904999"/>
             <a:ext cx="1233541" cy="461665"/>
           </a:xfrm>
           <a:prstGeom prst="rect">
@@ -5654,7 +5654,7 @@
         </p:nvSpPr>
         <p:spPr>
           <a:xfrm rot="10800000" flipV="1">
-            <a:off x="2029794" y="5081168"/>
+            <a:off x="2029794" y="4904999"/>
             <a:ext cx="1251857" cy="276999"/>
           </a:xfrm>
           <a:prstGeom prst="rect">
@@ -5702,7 +5702,7 @@
         </p:nvCxnSpPr>
         <p:spPr>
           <a:xfrm flipV="1">
-            <a:off x="3778670" y="4293144"/>
+            <a:off x="3778670" y="4116975"/>
             <a:ext cx="650907" cy="479450"/>
           </a:xfrm>
           <a:prstGeom prst="line">
@@ -5750,7 +5750,7 @@
         </p:nvCxnSpPr>
         <p:spPr>
           <a:xfrm>
-            <a:off x="3778670" y="5045814"/>
+            <a:off x="3778670" y="4869645"/>
             <a:ext cx="644685" cy="463421"/>
           </a:xfrm>
           <a:prstGeom prst="line">
@@ -5796,7 +5796,7 @@
         </p:nvSpPr>
         <p:spPr>
           <a:xfrm>
-            <a:off x="4429577" y="4113144"/>
+            <a:off x="4429577" y="3936975"/>
             <a:ext cx="360000" cy="360000"/>
           </a:xfrm>
           <a:prstGeom prst="flowChartConnector">
@@ -5857,7 +5857,7 @@
         </p:nvSpPr>
         <p:spPr>
           <a:xfrm rot="16200000">
-            <a:off x="3928834" y="4699986"/>
+            <a:off x="3928834" y="4523817"/>
             <a:ext cx="1328835" cy="461665"/>
           </a:xfrm>
           <a:prstGeom prst="rect">
@@ -5910,7 +5910,7 @@
         </p:nvSpPr>
         <p:spPr>
           <a:xfrm>
-            <a:off x="4166851" y="5709556"/>
+            <a:off x="4166851" y="5533387"/>
             <a:ext cx="907457" cy="276999"/>
           </a:xfrm>
           <a:prstGeom prst="rect">
@@ -5962,7 +5962,7 @@
         </p:nvCxnSpPr>
         <p:spPr>
           <a:xfrm>
-            <a:off x="2835470" y="4927459"/>
+            <a:off x="2835470" y="4751290"/>
             <a:ext cx="632155" cy="0"/>
           </a:xfrm>
           <a:prstGeom prst="line">
@@ -6008,7 +6008,7 @@
         </p:nvSpPr>
         <p:spPr>
           <a:xfrm>
-            <a:off x="3467625" y="4734247"/>
+            <a:off x="3467625" y="4558078"/>
             <a:ext cx="360000" cy="360000"/>
           </a:xfrm>
           <a:prstGeom prst="flowChartConnector">
@@ -6069,7 +6069,7 @@
         </p:nvSpPr>
         <p:spPr>
           <a:xfrm rot="10800000" flipV="1">
-            <a:off x="3021334" y="5081168"/>
+            <a:off x="3021334" y="4904999"/>
             <a:ext cx="1251857" cy="461665"/>
           </a:xfrm>
           <a:prstGeom prst="rect">
@@ -6114,7 +6114,7 @@
         </p:nvSpPr>
         <p:spPr>
           <a:xfrm>
-            <a:off x="5431408" y="4118096"/>
+            <a:off x="5431408" y="3941927"/>
             <a:ext cx="360000" cy="360000"/>
           </a:xfrm>
           <a:prstGeom prst="flowChartConnector">
@@ -6178,7 +6178,7 @@
         </p:nvCxnSpPr>
         <p:spPr>
           <a:xfrm>
-            <a:off x="4799253" y="4298096"/>
+            <a:off x="4799253" y="4121927"/>
             <a:ext cx="632155" cy="0"/>
           </a:xfrm>
           <a:prstGeom prst="line">
@@ -6224,7 +6224,7 @@
         </p:nvSpPr>
         <p:spPr>
           <a:xfrm rot="19094984">
-            <a:off x="3679623" y="4455066"/>
+            <a:off x="3679623" y="4278897"/>
             <a:ext cx="407923" cy="276999"/>
           </a:xfrm>
           <a:prstGeom prst="rect">
@@ -6278,7 +6278,7 @@
         </p:nvSpPr>
         <p:spPr>
           <a:xfrm rot="2229224">
-            <a:off x="3789389" y="4944209"/>
+            <a:off x="3789389" y="4768040"/>
             <a:ext cx="407923" cy="276999"/>
           </a:xfrm>
           <a:prstGeom prst="rect">
@@ -6332,7 +6332,7 @@
         </p:nvSpPr>
         <p:spPr>
           <a:xfrm>
-            <a:off x="4429577" y="5366558"/>
+            <a:off x="4429577" y="5190389"/>
             <a:ext cx="360000" cy="360000"/>
           </a:xfrm>
           <a:prstGeom prst="flowChartConnector">
@@ -6393,7 +6393,7 @@
         </p:nvSpPr>
         <p:spPr>
           <a:xfrm rot="10800000" flipV="1">
-            <a:off x="4987728" y="4462358"/>
+            <a:off x="4987728" y="4286189"/>
             <a:ext cx="1251857" cy="276999"/>
           </a:xfrm>
           <a:prstGeom prst="rect">
@@ -6438,8 +6438,8 @@
         </p:nvSpPr>
         <p:spPr>
           <a:xfrm>
-            <a:off x="5868625" y="3691715"/>
-            <a:ext cx="634984" cy="2471487"/>
+            <a:off x="5868625" y="3580863"/>
+            <a:ext cx="634984" cy="2997219"/>
           </a:xfrm>
           <a:prstGeom prst="rightBrace">
             <a:avLst/>
@@ -6483,7 +6483,7 @@
         </p:nvGrpSpPr>
         <p:grpSpPr>
           <a:xfrm>
-            <a:off x="6635215" y="4160340"/>
+            <a:off x="6635215" y="4329405"/>
             <a:ext cx="3898433" cy="1809136"/>
             <a:chOff x="5135942" y="3483853"/>
             <a:chExt cx="2689175" cy="1809136"/>
@@ -7038,7 +7038,7 @@
         </p:nvSpPr>
         <p:spPr>
           <a:xfrm>
-            <a:off x="1603695" y="3607409"/>
+            <a:off x="1603695" y="3716466"/>
             <a:ext cx="343950" cy="221763"/>
           </a:xfrm>
           <a:prstGeom prst="roundRect">
@@ -7084,7 +7084,7 @@
         </p:nvSpPr>
         <p:spPr>
           <a:xfrm>
-            <a:off x="1805182" y="3577500"/>
+            <a:off x="1805182" y="3686557"/>
             <a:ext cx="907457" cy="246221"/>
           </a:xfrm>
           <a:prstGeom prst="rect">
@@ -7130,7 +7130,7 @@
         </p:nvSpPr>
         <p:spPr>
           <a:xfrm>
-            <a:off x="2670287" y="3609091"/>
+            <a:off x="2670287" y="3718148"/>
             <a:ext cx="343950" cy="221763"/>
           </a:xfrm>
           <a:prstGeom prst="roundRect">
@@ -7183,7 +7183,7 @@
         </p:nvSpPr>
         <p:spPr>
           <a:xfrm>
-            <a:off x="2938886" y="3579182"/>
+            <a:off x="2938886" y="3688239"/>
             <a:ext cx="907457" cy="246221"/>
           </a:xfrm>
           <a:prstGeom prst="rect">
@@ -7212,6 +7212,260 @@
               <a:t>Professional</a:t>
             </a:r>
             <a:endParaRPr lang="en-GB" sz="1000" dirty="0"/>
+          </a:p>
+        </p:txBody>
+      </p:sp>
+      <p:sp>
+        <p:nvSpPr>
+          <p:cNvPr id="110" name="Flowchart: Connector 109">
+            <a:extLst>
+              <a:ext uri="{FF2B5EF4-FFF2-40B4-BE49-F238E27FC236}">
+                <a16:creationId xmlns:a16="http://schemas.microsoft.com/office/drawing/2014/main" id="{2A47087C-B802-4A41-B225-43532C6A37DD}"/>
+              </a:ext>
+            </a:extLst>
+          </p:cNvPr>
+          <p:cNvSpPr/>
+          <p:nvPr/>
+        </p:nvSpPr>
+        <p:spPr>
+          <a:xfrm>
+            <a:off x="1488079" y="5886133"/>
+            <a:ext cx="360000" cy="360000"/>
+          </a:xfrm>
+          <a:prstGeom prst="flowChartConnector">
+            <a:avLst/>
+          </a:prstGeom>
+          <a:solidFill>
+            <a:srgbClr val="FFFF00"/>
+          </a:solidFill>
+        </p:spPr>
+        <p:style>
+          <a:lnRef idx="2">
+            <a:schemeClr val="accent1">
+              <a:shade val="50000"/>
+            </a:schemeClr>
+          </a:lnRef>
+          <a:fillRef idx="1">
+            <a:schemeClr val="accent1"/>
+          </a:fillRef>
+          <a:effectRef idx="0">
+            <a:schemeClr val="accent1"/>
+          </a:effectRef>
+          <a:fontRef idx="minor">
+            <a:schemeClr val="lt1"/>
+          </a:fontRef>
+        </p:style>
+        <p:txBody>
+          <a:bodyPr wrap="none" lIns="0" tIns="0" rIns="0" bIns="0" rtlCol="0" anchor="ctr"/>
+          <a:lstStyle/>
+          <a:p>
+            <a:pPr algn="ctr"/>
+            <a:r>
+              <a:rPr lang="fr-FR" dirty="0">
+                <a:solidFill>
+                  <a:srgbClr val="305496"/>
+                </a:solidFill>
+              </a:rPr>
+              <a:t>C0</a:t>
+            </a:r>
+            <a:endParaRPr lang="en-GB" dirty="0">
+              <a:solidFill>
+                <a:srgbClr val="305496"/>
+              </a:solidFill>
+            </a:endParaRPr>
+          </a:p>
+        </p:txBody>
+      </p:sp>
+      <p:sp>
+        <p:nvSpPr>
+          <p:cNvPr id="111" name="Flowchart: Connector 110">
+            <a:extLst>
+              <a:ext uri="{FF2B5EF4-FFF2-40B4-BE49-F238E27FC236}">
+                <a16:creationId xmlns:a16="http://schemas.microsoft.com/office/drawing/2014/main" id="{6431AA16-2457-417B-83C5-94DF0FFBAB1D}"/>
+              </a:ext>
+            </a:extLst>
+          </p:cNvPr>
+          <p:cNvSpPr/>
+          <p:nvPr/>
+        </p:nvSpPr>
+        <p:spPr>
+          <a:xfrm>
+            <a:off x="5431408" y="5886133"/>
+            <a:ext cx="360000" cy="360000"/>
+          </a:xfrm>
+          <a:prstGeom prst="flowChartConnector">
+            <a:avLst/>
+          </a:prstGeom>
+          <a:solidFill>
+            <a:srgbClr val="FFFF00"/>
+          </a:solidFill>
+        </p:spPr>
+        <p:style>
+          <a:lnRef idx="2">
+            <a:schemeClr val="accent1">
+              <a:shade val="50000"/>
+            </a:schemeClr>
+          </a:lnRef>
+          <a:fillRef idx="1">
+            <a:schemeClr val="accent1"/>
+          </a:fillRef>
+          <a:effectRef idx="0">
+            <a:schemeClr val="accent1"/>
+          </a:effectRef>
+          <a:fontRef idx="minor">
+            <a:schemeClr val="lt1"/>
+          </a:fontRef>
+        </p:style>
+        <p:txBody>
+          <a:bodyPr wrap="none" lIns="0" tIns="0" rIns="0" bIns="0" rtlCol="0" anchor="ctr"/>
+          <a:lstStyle/>
+          <a:p>
+            <a:pPr algn="ctr"/>
+            <a:r>
+              <a:rPr lang="fr-FR" dirty="0">
+                <a:solidFill>
+                  <a:srgbClr val="305496"/>
+                </a:solidFill>
+              </a:rPr>
+              <a:t>C4</a:t>
+            </a:r>
+            <a:endParaRPr lang="en-GB" dirty="0">
+              <a:solidFill>
+                <a:srgbClr val="305496"/>
+              </a:solidFill>
+            </a:endParaRPr>
+          </a:p>
+        </p:txBody>
+      </p:sp>
+      <p:cxnSp>
+        <p:nvCxnSpPr>
+          <p:cNvPr id="112" name="Straight Connector 111">
+            <a:extLst>
+              <a:ext uri="{FF2B5EF4-FFF2-40B4-BE49-F238E27FC236}">
+                <a16:creationId xmlns:a16="http://schemas.microsoft.com/office/drawing/2014/main" id="{5447089F-9C4F-4712-8771-7E406FD513A1}"/>
+              </a:ext>
+            </a:extLst>
+          </p:cNvPr>
+          <p:cNvCxnSpPr>
+            <a:cxnSpLocks/>
+            <a:stCxn id="110" idx="6"/>
+            <a:endCxn id="111" idx="2"/>
+          </p:cNvCxnSpPr>
+          <p:nvPr/>
+        </p:nvCxnSpPr>
+        <p:spPr>
+          <a:xfrm>
+            <a:off x="1848079" y="6066133"/>
+            <a:ext cx="3583329" cy="0"/>
+          </a:xfrm>
+          <a:prstGeom prst="line">
+            <a:avLst/>
+          </a:prstGeom>
+          <a:ln w="19050">
+            <a:solidFill>
+              <a:schemeClr val="accent2">
+                <a:lumMod val="75000"/>
+              </a:schemeClr>
+            </a:solidFill>
+            <a:prstDash val="sysDash"/>
+            <a:headEnd type="none" w="med" len="med"/>
+            <a:tailEnd type="triangle" w="med" len="med"/>
+          </a:ln>
+        </p:spPr>
+        <p:style>
+          <a:lnRef idx="1">
+            <a:schemeClr val="accent1"/>
+          </a:lnRef>
+          <a:fillRef idx="0">
+            <a:schemeClr val="accent1"/>
+          </a:fillRef>
+          <a:effectRef idx="0">
+            <a:schemeClr val="accent1"/>
+          </a:effectRef>
+          <a:fontRef idx="minor">
+            <a:schemeClr val="tx1"/>
+          </a:fontRef>
+        </p:style>
+      </p:cxnSp>
+      <p:sp>
+        <p:nvSpPr>
+          <p:cNvPr id="113" name="TextBox 112">
+            <a:extLst>
+              <a:ext uri="{FF2B5EF4-FFF2-40B4-BE49-F238E27FC236}">
+                <a16:creationId xmlns:a16="http://schemas.microsoft.com/office/drawing/2014/main" id="{BDDCFD3C-1A3C-41B5-BD05-AA9EEBBE3DBF}"/>
+              </a:ext>
+            </a:extLst>
+          </p:cNvPr>
+          <p:cNvSpPr txBox="1"/>
+          <p:nvPr/>
+        </p:nvSpPr>
+        <p:spPr>
+          <a:xfrm>
+            <a:off x="1042402" y="6233055"/>
+            <a:ext cx="1233541" cy="276999"/>
+          </a:xfrm>
+          <a:prstGeom prst="rect">
+            <a:avLst/>
+          </a:prstGeom>
+          <a:noFill/>
+        </p:spPr>
+        <p:txBody>
+          <a:bodyPr wrap="square" rtlCol="0">
+            <a:spAutoFit/>
+          </a:bodyPr>
+          <a:lstStyle/>
+          <a:p>
+            <a:pPr algn="ctr"/>
+            <a:r>
+              <a:rPr lang="fr-FR" sz="1200" dirty="0"/>
+              <a:t>Cancel</a:t>
+            </a:r>
+            <a:endParaRPr lang="en-GB" sz="1200" dirty="0"/>
+          </a:p>
+        </p:txBody>
+      </p:sp>
+      <p:sp>
+        <p:nvSpPr>
+          <p:cNvPr id="114" name="TextBox 113">
+            <a:extLst>
+              <a:ext uri="{FF2B5EF4-FFF2-40B4-BE49-F238E27FC236}">
+                <a16:creationId xmlns:a16="http://schemas.microsoft.com/office/drawing/2014/main" id="{A4AD4047-5BE7-4388-B696-0722A5B36251}"/>
+              </a:ext>
+            </a:extLst>
+          </p:cNvPr>
+          <p:cNvSpPr txBox="1"/>
+          <p:nvPr/>
+        </p:nvSpPr>
+        <p:spPr>
+          <a:xfrm rot="10800000" flipV="1">
+            <a:off x="4987728" y="6233054"/>
+            <a:ext cx="1251857" cy="276999"/>
+          </a:xfrm>
+          <a:prstGeom prst="rect">
+            <a:avLst/>
+          </a:prstGeom>
+          <a:noFill/>
+        </p:spPr>
+        <p:txBody>
+          <a:bodyPr wrap="square" rtlCol="0">
+            <a:spAutoFit/>
+          </a:bodyPr>
+          <a:lstStyle/>
+          <a:p>
+            <a:pPr algn="ctr"/>
+            <a:r>
+              <a:rPr lang="fr-FR" sz="1200" dirty="0" err="1"/>
+              <a:t>Send</a:t>
+            </a:r>
+            <a:r>
+              <a:rPr lang="fr-FR" sz="1200" dirty="0"/>
+              <a:t> </a:t>
+            </a:r>
+            <a:r>
+              <a:rPr lang="fr-FR" sz="1200" dirty="0" err="1"/>
+              <a:t>refund</a:t>
+            </a:r>
+            <a:endParaRPr lang="en-GB" sz="1200" dirty="0"/>
           </a:p>
         </p:txBody>
       </p:sp>
@@ -10174,7 +10428,7 @@
         <p:spPr>
           <a:xfrm>
             <a:off x="5868625" y="3691715"/>
-            <a:ext cx="634984" cy="2471487"/>
+            <a:ext cx="634984" cy="3091640"/>
           </a:xfrm>
           <a:prstGeom prst="rightBrace">
             <a:avLst/>
@@ -10218,7 +10472,7 @@
         </p:nvGrpSpPr>
         <p:grpSpPr>
           <a:xfrm>
-            <a:off x="6663207" y="4067031"/>
+            <a:off x="6663207" y="4234979"/>
             <a:ext cx="4034492" cy="2156484"/>
             <a:chOff x="5135942" y="3483853"/>
             <a:chExt cx="2702781" cy="2006481"/>
@@ -10438,7 +10692,7 @@
         </p:nvSpPr>
         <p:spPr>
           <a:xfrm>
-            <a:off x="1586917" y="3735213"/>
+            <a:off x="1586917" y="3819192"/>
             <a:ext cx="343950" cy="221763"/>
           </a:xfrm>
           <a:prstGeom prst="roundRect">
@@ -10484,7 +10738,7 @@
         </p:nvSpPr>
         <p:spPr>
           <a:xfrm>
-            <a:off x="1788404" y="3705304"/>
+            <a:off x="1788404" y="3789283"/>
             <a:ext cx="907457" cy="246221"/>
           </a:xfrm>
           <a:prstGeom prst="rect">
@@ -10530,7 +10784,7 @@
         </p:nvSpPr>
         <p:spPr>
           <a:xfrm>
-            <a:off x="2653509" y="3736895"/>
+            <a:off x="2653509" y="3820874"/>
             <a:ext cx="343950" cy="221763"/>
           </a:xfrm>
           <a:prstGeom prst="roundRect">
@@ -10583,7 +10837,7 @@
         </p:nvSpPr>
         <p:spPr>
           <a:xfrm>
-            <a:off x="2922108" y="3706986"/>
+            <a:off x="2922108" y="3790965"/>
             <a:ext cx="907457" cy="246221"/>
           </a:xfrm>
           <a:prstGeom prst="rect">
@@ -10612,6 +10866,259 @@
               <a:t>Professionnel</a:t>
             </a:r>
             <a:endParaRPr lang="en-GB" sz="1000" dirty="0"/>
+          </a:p>
+        </p:txBody>
+      </p:sp>
+      <p:sp>
+        <p:nvSpPr>
+          <p:cNvPr id="83" name="Flowchart: Connector 82">
+            <a:extLst>
+              <a:ext uri="{FF2B5EF4-FFF2-40B4-BE49-F238E27FC236}">
+                <a16:creationId xmlns:a16="http://schemas.microsoft.com/office/drawing/2014/main" id="{1CE45195-19FB-42C9-B1C6-D46FA6A6242C}"/>
+              </a:ext>
+            </a:extLst>
+          </p:cNvPr>
+          <p:cNvSpPr/>
+          <p:nvPr/>
+        </p:nvSpPr>
+        <p:spPr>
+          <a:xfrm>
+            <a:off x="1488079" y="5886133"/>
+            <a:ext cx="360000" cy="360000"/>
+          </a:xfrm>
+          <a:prstGeom prst="flowChartConnector">
+            <a:avLst/>
+          </a:prstGeom>
+          <a:solidFill>
+            <a:srgbClr val="FFFF00"/>
+          </a:solidFill>
+        </p:spPr>
+        <p:style>
+          <a:lnRef idx="2">
+            <a:schemeClr val="accent1">
+              <a:shade val="50000"/>
+            </a:schemeClr>
+          </a:lnRef>
+          <a:fillRef idx="1">
+            <a:schemeClr val="accent1"/>
+          </a:fillRef>
+          <a:effectRef idx="0">
+            <a:schemeClr val="accent1"/>
+          </a:effectRef>
+          <a:fontRef idx="minor">
+            <a:schemeClr val="lt1"/>
+          </a:fontRef>
+        </p:style>
+        <p:txBody>
+          <a:bodyPr wrap="none" lIns="0" tIns="0" rIns="0" bIns="0" rtlCol="0" anchor="ctr"/>
+          <a:lstStyle/>
+          <a:p>
+            <a:pPr algn="ctr"/>
+            <a:r>
+              <a:rPr lang="fr-FR" dirty="0">
+                <a:solidFill>
+                  <a:srgbClr val="305496"/>
+                </a:solidFill>
+              </a:rPr>
+              <a:t>C0</a:t>
+            </a:r>
+            <a:endParaRPr lang="en-GB" dirty="0">
+              <a:solidFill>
+                <a:srgbClr val="305496"/>
+              </a:solidFill>
+            </a:endParaRPr>
+          </a:p>
+        </p:txBody>
+      </p:sp>
+      <p:sp>
+        <p:nvSpPr>
+          <p:cNvPr id="84" name="Flowchart: Connector 83">
+            <a:extLst>
+              <a:ext uri="{FF2B5EF4-FFF2-40B4-BE49-F238E27FC236}">
+                <a16:creationId xmlns:a16="http://schemas.microsoft.com/office/drawing/2014/main" id="{B318096C-907E-4754-BCD1-78FD74DE401B}"/>
+              </a:ext>
+            </a:extLst>
+          </p:cNvPr>
+          <p:cNvSpPr/>
+          <p:nvPr/>
+        </p:nvSpPr>
+        <p:spPr>
+          <a:xfrm>
+            <a:off x="5431408" y="5886133"/>
+            <a:ext cx="360000" cy="360000"/>
+          </a:xfrm>
+          <a:prstGeom prst="flowChartConnector">
+            <a:avLst/>
+          </a:prstGeom>
+          <a:solidFill>
+            <a:srgbClr val="FFFF00"/>
+          </a:solidFill>
+        </p:spPr>
+        <p:style>
+          <a:lnRef idx="2">
+            <a:schemeClr val="accent1">
+              <a:shade val="50000"/>
+            </a:schemeClr>
+          </a:lnRef>
+          <a:fillRef idx="1">
+            <a:schemeClr val="accent1"/>
+          </a:fillRef>
+          <a:effectRef idx="0">
+            <a:schemeClr val="accent1"/>
+          </a:effectRef>
+          <a:fontRef idx="minor">
+            <a:schemeClr val="lt1"/>
+          </a:fontRef>
+        </p:style>
+        <p:txBody>
+          <a:bodyPr wrap="none" lIns="0" tIns="0" rIns="0" bIns="0" rtlCol="0" anchor="ctr"/>
+          <a:lstStyle/>
+          <a:p>
+            <a:pPr algn="ctr"/>
+            <a:r>
+              <a:rPr lang="fr-FR" dirty="0">
+                <a:solidFill>
+                  <a:srgbClr val="305496"/>
+                </a:solidFill>
+              </a:rPr>
+              <a:t>C4</a:t>
+            </a:r>
+            <a:endParaRPr lang="en-GB" dirty="0">
+              <a:solidFill>
+                <a:srgbClr val="305496"/>
+              </a:solidFill>
+            </a:endParaRPr>
+          </a:p>
+        </p:txBody>
+      </p:sp>
+      <p:cxnSp>
+        <p:nvCxnSpPr>
+          <p:cNvPr id="85" name="Straight Connector 84">
+            <a:extLst>
+              <a:ext uri="{FF2B5EF4-FFF2-40B4-BE49-F238E27FC236}">
+                <a16:creationId xmlns:a16="http://schemas.microsoft.com/office/drawing/2014/main" id="{828B53B0-D747-4A95-BEA5-EEB80101786A}"/>
+              </a:ext>
+            </a:extLst>
+          </p:cNvPr>
+          <p:cNvCxnSpPr>
+            <a:cxnSpLocks/>
+            <a:stCxn id="83" idx="6"/>
+            <a:endCxn id="84" idx="2"/>
+          </p:cNvCxnSpPr>
+          <p:nvPr/>
+        </p:nvCxnSpPr>
+        <p:spPr>
+          <a:xfrm>
+            <a:off x="1848079" y="6066133"/>
+            <a:ext cx="3583329" cy="0"/>
+          </a:xfrm>
+          <a:prstGeom prst="line">
+            <a:avLst/>
+          </a:prstGeom>
+          <a:ln w="19050">
+            <a:solidFill>
+              <a:schemeClr val="accent2">
+                <a:lumMod val="75000"/>
+              </a:schemeClr>
+            </a:solidFill>
+            <a:prstDash val="sysDash"/>
+            <a:headEnd type="none" w="med" len="med"/>
+            <a:tailEnd type="triangle" w="med" len="med"/>
+          </a:ln>
+        </p:spPr>
+        <p:style>
+          <a:lnRef idx="1">
+            <a:schemeClr val="accent1"/>
+          </a:lnRef>
+          <a:fillRef idx="0">
+            <a:schemeClr val="accent1"/>
+          </a:fillRef>
+          <a:effectRef idx="0">
+            <a:schemeClr val="accent1"/>
+          </a:effectRef>
+          <a:fontRef idx="minor">
+            <a:schemeClr val="tx1"/>
+          </a:fontRef>
+        </p:style>
+      </p:cxnSp>
+      <p:sp>
+        <p:nvSpPr>
+          <p:cNvPr id="86" name="TextBox 85">
+            <a:extLst>
+              <a:ext uri="{FF2B5EF4-FFF2-40B4-BE49-F238E27FC236}">
+                <a16:creationId xmlns:a16="http://schemas.microsoft.com/office/drawing/2014/main" id="{3CFABE53-DDA7-4BDB-AFAE-FB1448DB62B0}"/>
+              </a:ext>
+            </a:extLst>
+          </p:cNvPr>
+          <p:cNvSpPr txBox="1"/>
+          <p:nvPr/>
+        </p:nvSpPr>
+        <p:spPr>
+          <a:xfrm>
+            <a:off x="1048624" y="6223515"/>
+            <a:ext cx="1233541" cy="276999"/>
+          </a:xfrm>
+          <a:prstGeom prst="rect">
+            <a:avLst/>
+          </a:prstGeom>
+          <a:noFill/>
+        </p:spPr>
+        <p:txBody>
+          <a:bodyPr wrap="square" rtlCol="0">
+            <a:spAutoFit/>
+          </a:bodyPr>
+          <a:lstStyle/>
+          <a:p>
+            <a:pPr algn="ctr"/>
+            <a:r>
+              <a:rPr lang="fr-FR" sz="1200" dirty="0"/>
+              <a:t>Annulation</a:t>
+            </a:r>
+            <a:endParaRPr lang="en-GB" sz="1200" dirty="0"/>
+          </a:p>
+        </p:txBody>
+      </p:sp>
+      <p:sp>
+        <p:nvSpPr>
+          <p:cNvPr id="87" name="TextBox 86">
+            <a:extLst>
+              <a:ext uri="{FF2B5EF4-FFF2-40B4-BE49-F238E27FC236}">
+                <a16:creationId xmlns:a16="http://schemas.microsoft.com/office/drawing/2014/main" id="{ADA4BD14-5657-4027-99F6-A5FD5C9D3268}"/>
+              </a:ext>
+            </a:extLst>
+          </p:cNvPr>
+          <p:cNvSpPr txBox="1"/>
+          <p:nvPr/>
+        </p:nvSpPr>
+        <p:spPr>
+          <a:xfrm rot="10800000" flipV="1">
+            <a:off x="4981812" y="6220978"/>
+            <a:ext cx="1251857" cy="461665"/>
+          </a:xfrm>
+          <a:prstGeom prst="rect">
+            <a:avLst/>
+          </a:prstGeom>
+          <a:noFill/>
+        </p:spPr>
+        <p:txBody>
+          <a:bodyPr wrap="square" rtlCol="0">
+            <a:spAutoFit/>
+          </a:bodyPr>
+          <a:lstStyle/>
+          <a:p>
+            <a:pPr algn="ctr"/>
+            <a:r>
+              <a:rPr lang="fr-FR" sz="1200" dirty="0"/>
+              <a:t>Envoyer</a:t>
+            </a:r>
+          </a:p>
+          <a:p>
+            <a:pPr algn="ctr"/>
+            <a:r>
+              <a:rPr lang="fr-FR" sz="1200" dirty="0"/>
+              <a:t>remboursement</a:t>
+            </a:r>
+            <a:endParaRPr lang="en-GB" sz="1200" dirty="0"/>
           </a:p>
         </p:txBody>
       </p:sp>

</xml_diff>